<commit_message>
update slide 7 anonymous types
</commit_message>
<xml_diff>
--- a/1. Document/Slides/07-Anonymous Types.pptx
+++ b/1. Document/Slides/07-Anonymous Types.pptx
@@ -212,7 +212,7 @@
           <a:p>
             <a:fld id="{749F7025-33D9-4E9F-9955-A14222A03D05}" type="datetimeFigureOut">
               <a:rPr lang="en-US" smtClean="0"/>
-              <a:t>1/20/2025</a:t>
+              <a:t>1/21/2025</a:t>
             </a:fld>
             <a:endParaRPr lang="en-US"/>
           </a:p>
@@ -523,7 +523,10 @@
           <a:bodyPr/>
           <a:lstStyle/>
           <a:p>
-            <a:endParaRPr lang="en-US" dirty="0"/>
+            <a:r>
+              <a:rPr lang="en-US" dirty="0"/>
+              <a:t>- một Object vô danh</a:t>
+            </a:r>
           </a:p>
         </p:txBody>
       </p:sp>
@@ -612,15 +615,46 @@
               <a:buChar char="-"/>
             </a:pPr>
             <a:r>
-              <a:rPr lang="en-US" dirty="0"/>
-              <a:t>một lớp không tên</a:t>
-            </a:r>
+              <a:rPr lang="vi-VN" b="1" dirty="0"/>
+              <a:t>đối tượng tạm thời</a:t>
+            </a:r>
+            <a:r>
+              <a:rPr lang="vi-VN" dirty="0"/>
+              <a:t> mà không cần định nghĩa lớp riêng</a:t>
+            </a:r>
+            <a:endParaRPr lang="en-US" dirty="0"/>
           </a:p>
           <a:p>
             <a:pPr marL="171450" indent="-171450">
               <a:buFontTx/>
               <a:buChar char="-"/>
             </a:pPr>
+            <a:r>
+              <a:rPr lang="vi-VN" b="1" dirty="0"/>
+              <a:t>Chỉ cần lưu trữ dữ liệu liên quan tạm thời.</a:t>
+            </a:r>
+            <a:endParaRPr lang="en-US" b="1" dirty="0"/>
+          </a:p>
+          <a:p>
+            <a:pPr marL="171450" indent="-171450">
+              <a:buFontTx/>
+              <a:buChar char="-"/>
+            </a:pPr>
+            <a:r>
+              <a:rPr lang="vi-VN" b="1" dirty="0"/>
+              <a:t>Không cần phương thức hoặc hành vi phức tạp.</a:t>
+            </a:r>
+            <a:endParaRPr lang="en-US" b="1" dirty="0"/>
+          </a:p>
+          <a:p>
+            <a:pPr marL="171450" indent="-171450">
+              <a:buFontTx/>
+              <a:buChar char="-"/>
+            </a:pPr>
+            <a:r>
+              <a:rPr lang="vi-VN" b="1" dirty="0"/>
+              <a:t>Các thuộc tính và thứ tự có thể khác nhau tùy từng khai báo.</a:t>
+            </a:r>
             <a:endParaRPr lang="en-US" dirty="0"/>
           </a:p>
         </p:txBody>
@@ -705,6 +739,292 @@
           <a:bodyPr/>
           <a:lstStyle/>
           <a:p>
+            <a:pPr marL="171450" indent="-171450">
+              <a:buFontTx/>
+              <a:buChar char="-"/>
+            </a:pPr>
+            <a:r>
+              <a:rPr lang="en-US" dirty="0"/>
+              <a:t>cần 1 object để lưu trữ tạm thời 1 object nào đó</a:t>
+            </a:r>
+          </a:p>
+          <a:p>
+            <a:pPr marL="171450" indent="-171450">
+              <a:buFontTx/>
+              <a:buChar char="-"/>
+            </a:pPr>
+            <a:r>
+              <a:rPr lang="en-US" dirty="0"/>
+              <a:t>Không cần phương thức</a:t>
+            </a:r>
+          </a:p>
+          <a:p>
+            <a:pPr marL="171450" indent="-171450">
+              <a:buFontTx/>
+              <a:buChar char="-"/>
+            </a:pPr>
+            <a:r>
+              <a:rPr lang="en-US" b="1" dirty="0"/>
+              <a:t>Mỗi khai báo có một tập hợp thuộc tính khác nhau.</a:t>
+            </a:r>
+          </a:p>
+          <a:p>
+            <a:pPr marL="171450" indent="-171450">
+              <a:buFontTx/>
+              <a:buChar char="-"/>
+            </a:pPr>
+            <a:r>
+              <a:rPr lang="en-US" b="1" dirty="0"/>
+              <a:t>Thứ tự thuộc tính có thể thay đổi.</a:t>
+            </a:r>
+            <a:endParaRPr lang="en-US" dirty="0"/>
+          </a:p>
+        </p:txBody>
+      </p:sp>
+      <p:sp>
+        <p:nvSpPr>
+          <p:cNvPr id="4" name="Slide Number Placeholder 3"/>
+          <p:cNvSpPr>
+            <a:spLocks noGrp="1"/>
+          </p:cNvSpPr>
+          <p:nvPr>
+            <p:ph type="sldNum" sz="quarter" idx="5"/>
+          </p:nvPr>
+        </p:nvSpPr>
+        <p:spPr/>
+        <p:txBody>
+          <a:bodyPr/>
+          <a:lstStyle/>
+          <a:p>
+            <a:fld id="{46D3E3EA-CC6A-448F-83C3-9A526F33CF9E}" type="slidenum">
+              <a:rPr lang="en-US" smtClean="0"/>
+              <a:t>3</a:t>
+            </a:fld>
+            <a:endParaRPr lang="en-US"/>
+          </a:p>
+        </p:txBody>
+      </p:sp>
+    </p:spTree>
+    <p:extLst>
+      <p:ext uri="{BB962C8B-B14F-4D97-AF65-F5344CB8AC3E}">
+        <p14:creationId xmlns:p14="http://schemas.microsoft.com/office/powerpoint/2010/main" val="1291402192"/>
+      </p:ext>
+    </p:extLst>
+  </p:cSld>
+  <p:clrMapOvr>
+    <a:masterClrMapping/>
+  </p:clrMapOvr>
+</p:notes>
+</file>
+
+<file path=ppt/notesSlides/notesSlide4.xml><?xml version="1.0" encoding="utf-8"?>
+<p:notes xmlns:a="http://schemas.openxmlformats.org/drawingml/2006/main" xmlns:r="http://schemas.openxmlformats.org/officeDocument/2006/relationships" xmlns:p="http://schemas.openxmlformats.org/presentationml/2006/main">
+  <p:cSld>
+    <p:spTree>
+      <p:nvGrpSpPr>
+        <p:cNvPr id="1" name=""/>
+        <p:cNvGrpSpPr/>
+        <p:nvPr/>
+      </p:nvGrpSpPr>
+      <p:grpSpPr>
+        <a:xfrm>
+          <a:off x="0" y="0"/>
+          <a:ext cx="0" cy="0"/>
+          <a:chOff x="0" y="0"/>
+          <a:chExt cx="0" cy="0"/>
+        </a:xfrm>
+      </p:grpSpPr>
+      <p:sp>
+        <p:nvSpPr>
+          <p:cNvPr id="2" name="Slide Image Placeholder 1"/>
+          <p:cNvSpPr>
+            <a:spLocks noGrp="1" noRot="1" noChangeAspect="1"/>
+          </p:cNvSpPr>
+          <p:nvPr>
+            <p:ph type="sldImg"/>
+          </p:nvPr>
+        </p:nvSpPr>
+        <p:spPr/>
+      </p:sp>
+      <p:sp>
+        <p:nvSpPr>
+          <p:cNvPr id="3" name="Notes Placeholder 2"/>
+          <p:cNvSpPr>
+            <a:spLocks noGrp="1"/>
+          </p:cNvSpPr>
+          <p:nvPr>
+            <p:ph type="body" idx="1"/>
+          </p:nvPr>
+        </p:nvSpPr>
+        <p:spPr/>
+        <p:txBody>
+          <a:bodyPr/>
+          <a:lstStyle/>
+          <a:p>
+            <a:r>
+              <a:rPr lang="vi-VN" b="1" dirty="0"/>
+              <a:t>không nên sử dụng anonymous types</a:t>
+            </a:r>
+            <a:r>
+              <a:rPr lang="vi-VN" dirty="0"/>
+              <a:t> trong các trường hợp:</a:t>
+            </a:r>
+          </a:p>
+          <a:p>
+            <a:pPr>
+              <a:buFont typeface="+mj-lt"/>
+              <a:buAutoNum type="arabicPeriod"/>
+            </a:pPr>
+            <a:r>
+              <a:rPr lang="vi-VN" dirty="0"/>
+              <a:t>Khi cần tái sử dụng kiểu dữ liệu ở nhiều nơi.</a:t>
+            </a:r>
+          </a:p>
+          <a:p>
+            <a:pPr>
+              <a:buFont typeface="+mj-lt"/>
+              <a:buAutoNum type="arabicPeriod"/>
+            </a:pPr>
+            <a:r>
+              <a:rPr lang="vi-VN" dirty="0"/>
+              <a:t>Khi cần thêm logic hoặc phương thức.</a:t>
+            </a:r>
+          </a:p>
+          <a:p>
+            <a:pPr>
+              <a:buFont typeface="+mj-lt"/>
+              <a:buAutoNum type="arabicPeriod"/>
+            </a:pPr>
+            <a:r>
+              <a:rPr lang="vi-VN" dirty="0"/>
+              <a:t>Khi cần sửa đổi giá trị thuộc tính sau khi khởi tạo.</a:t>
+            </a:r>
+          </a:p>
+          <a:p>
+            <a:pPr>
+              <a:buFont typeface="+mj-lt"/>
+              <a:buAutoNum type="arabicPeriod"/>
+            </a:pPr>
+            <a:r>
+              <a:rPr lang="vi-VN" dirty="0"/>
+              <a:t>Khi cần truyền dữ liệu giữa các phương thức hoặc lớp.</a:t>
+            </a:r>
+          </a:p>
+          <a:p>
+            <a:pPr>
+              <a:buFont typeface="+mj-lt"/>
+              <a:buAutoNum type="arabicPeriod"/>
+            </a:pPr>
+            <a:r>
+              <a:rPr lang="vi-VN" dirty="0"/>
+              <a:t>Khi cần kế thừa hoặc sử dụng interface.</a:t>
+            </a:r>
+          </a:p>
+          <a:p>
+            <a:pPr>
+              <a:buFont typeface="+mj-lt"/>
+              <a:buAutoNum type="arabicPeriod"/>
+            </a:pPr>
+            <a:r>
+              <a:rPr lang="vi-VN" dirty="0"/>
+              <a:t>Khi dữ liệu phức tạp cần xử lý ngoài phạm vi LINQ.</a:t>
+            </a:r>
+          </a:p>
+          <a:p>
+            <a:pPr>
+              <a:buFont typeface="+mj-lt"/>
+              <a:buAutoNum type="arabicPeriod"/>
+            </a:pPr>
+            <a:r>
+              <a:rPr lang="vi-VN" dirty="0"/>
+              <a:t>Khi cần debug hoặc log dữ liệu phức tạp.</a:t>
+            </a:r>
+          </a:p>
+          <a:p>
+            <a:endParaRPr lang="en-US" dirty="0"/>
+          </a:p>
+        </p:txBody>
+      </p:sp>
+      <p:sp>
+        <p:nvSpPr>
+          <p:cNvPr id="4" name="Slide Number Placeholder 3"/>
+          <p:cNvSpPr>
+            <a:spLocks noGrp="1"/>
+          </p:cNvSpPr>
+          <p:nvPr>
+            <p:ph type="sldNum" sz="quarter" idx="5"/>
+          </p:nvPr>
+        </p:nvSpPr>
+        <p:spPr/>
+        <p:txBody>
+          <a:bodyPr/>
+          <a:lstStyle/>
+          <a:p>
+            <a:fld id="{46D3E3EA-CC6A-448F-83C3-9A526F33CF9E}" type="slidenum">
+              <a:rPr lang="en-US" smtClean="0"/>
+              <a:t>4</a:t>
+            </a:fld>
+            <a:endParaRPr lang="en-US"/>
+          </a:p>
+        </p:txBody>
+      </p:sp>
+    </p:spTree>
+    <p:extLst>
+      <p:ext uri="{BB962C8B-B14F-4D97-AF65-F5344CB8AC3E}">
+        <p14:creationId xmlns:p14="http://schemas.microsoft.com/office/powerpoint/2010/main" val="621955182"/>
+      </p:ext>
+    </p:extLst>
+  </p:cSld>
+  <p:clrMapOvr>
+    <a:masterClrMapping/>
+  </p:clrMapOvr>
+</p:notes>
+</file>
+
+<file path=ppt/notesSlides/notesSlide5.xml><?xml version="1.0" encoding="utf-8"?>
+<p:notes xmlns:a="http://schemas.openxmlformats.org/drawingml/2006/main" xmlns:r="http://schemas.openxmlformats.org/officeDocument/2006/relationships" xmlns:p="http://schemas.openxmlformats.org/presentationml/2006/main">
+  <p:cSld>
+    <p:spTree>
+      <p:nvGrpSpPr>
+        <p:cNvPr id="1" name=""/>
+        <p:cNvGrpSpPr/>
+        <p:nvPr/>
+      </p:nvGrpSpPr>
+      <p:grpSpPr>
+        <a:xfrm>
+          <a:off x="0" y="0"/>
+          <a:ext cx="0" cy="0"/>
+          <a:chOff x="0" y="0"/>
+          <a:chExt cx="0" cy="0"/>
+        </a:xfrm>
+      </p:grpSpPr>
+      <p:sp>
+        <p:nvSpPr>
+          <p:cNvPr id="2" name="Slide Image Placeholder 1"/>
+          <p:cNvSpPr>
+            <a:spLocks noGrp="1" noRot="1" noChangeAspect="1"/>
+          </p:cNvSpPr>
+          <p:nvPr>
+            <p:ph type="sldImg"/>
+          </p:nvPr>
+        </p:nvSpPr>
+        <p:spPr/>
+      </p:sp>
+      <p:sp>
+        <p:nvSpPr>
+          <p:cNvPr id="3" name="Notes Placeholder 2"/>
+          <p:cNvSpPr>
+            <a:spLocks noGrp="1"/>
+          </p:cNvSpPr>
+          <p:nvPr>
+            <p:ph type="body" idx="1"/>
+          </p:nvPr>
+        </p:nvSpPr>
+        <p:spPr/>
+        <p:txBody>
+          <a:bodyPr/>
+          <a:lstStyle/>
+          <a:p>
             <a:endParaRPr lang="en-US"/>
           </a:p>
         </p:txBody>
@@ -924,7 +1244,7 @@
           <a:p>
             <a:fld id="{1ADF62C2-72EA-4953-A1D6-568F980002B8}" type="datetimeFigureOut">
               <a:rPr lang="en-US" smtClean="0"/>
-              <a:t>1/20/2025</a:t>
+              <a:t>1/21/2025</a:t>
             </a:fld>
             <a:endParaRPr lang="en-US"/>
           </a:p>
@@ -1092,7 +1412,7 @@
           <a:p>
             <a:fld id="{1ADF62C2-72EA-4953-A1D6-568F980002B8}" type="datetimeFigureOut">
               <a:rPr lang="en-US" smtClean="0"/>
-              <a:t>1/20/2025</a:t>
+              <a:t>1/21/2025</a:t>
             </a:fld>
             <a:endParaRPr lang="en-US"/>
           </a:p>
@@ -1270,7 +1590,7 @@
           <a:p>
             <a:fld id="{1ADF62C2-72EA-4953-A1D6-568F980002B8}" type="datetimeFigureOut">
               <a:rPr lang="en-US" smtClean="0"/>
-              <a:t>1/20/2025</a:t>
+              <a:t>1/21/2025</a:t>
             </a:fld>
             <a:endParaRPr lang="en-US"/>
           </a:p>
@@ -1902,7 +2222,7 @@
           <a:p>
             <a:fld id="{1ADF62C2-72EA-4953-A1D6-568F980002B8}" type="datetimeFigureOut">
               <a:rPr lang="en-US" smtClean="0"/>
-              <a:t>1/20/2025</a:t>
+              <a:t>1/21/2025</a:t>
             </a:fld>
             <a:endParaRPr lang="en-US"/>
           </a:p>
@@ -2187,7 +2507,7 @@
           <a:p>
             <a:fld id="{1ADF62C2-72EA-4953-A1D6-568F980002B8}" type="datetimeFigureOut">
               <a:rPr lang="en-US" smtClean="0"/>
-              <a:t>1/20/2025</a:t>
+              <a:t>1/21/2025</a:t>
             </a:fld>
             <a:endParaRPr lang="en-US"/>
           </a:p>
@@ -2606,7 +2926,7 @@
           <a:p>
             <a:fld id="{1ADF62C2-72EA-4953-A1D6-568F980002B8}" type="datetimeFigureOut">
               <a:rPr lang="en-US" smtClean="0"/>
-              <a:t>1/20/2025</a:t>
+              <a:t>1/21/2025</a:t>
             </a:fld>
             <a:endParaRPr lang="en-US"/>
           </a:p>
@@ -2723,7 +3043,7 @@
           <a:p>
             <a:fld id="{1ADF62C2-72EA-4953-A1D6-568F980002B8}" type="datetimeFigureOut">
               <a:rPr lang="en-US" smtClean="0"/>
-              <a:t>1/20/2025</a:t>
+              <a:t>1/21/2025</a:t>
             </a:fld>
             <a:endParaRPr lang="en-US"/>
           </a:p>
@@ -2818,7 +3138,7 @@
           <a:p>
             <a:fld id="{1ADF62C2-72EA-4953-A1D6-568F980002B8}" type="datetimeFigureOut">
               <a:rPr lang="en-US" smtClean="0"/>
-              <a:t>1/20/2025</a:t>
+              <a:t>1/21/2025</a:t>
             </a:fld>
             <a:endParaRPr lang="en-US"/>
           </a:p>
@@ -3093,7 +3413,7 @@
           <a:p>
             <a:fld id="{1ADF62C2-72EA-4953-A1D6-568F980002B8}" type="datetimeFigureOut">
               <a:rPr lang="en-US" smtClean="0"/>
-              <a:t>1/20/2025</a:t>
+              <a:t>1/21/2025</a:t>
             </a:fld>
             <a:endParaRPr lang="en-US"/>
           </a:p>
@@ -3345,7 +3665,7 @@
           <a:p>
             <a:fld id="{1ADF62C2-72EA-4953-A1D6-568F980002B8}" type="datetimeFigureOut">
               <a:rPr lang="en-US" smtClean="0"/>
-              <a:t>1/20/2025</a:t>
+              <a:t>1/21/2025</a:t>
             </a:fld>
             <a:endParaRPr lang="en-US"/>
           </a:p>
@@ -3556,7 +3876,7 @@
           <a:p>
             <a:fld id="{1ADF62C2-72EA-4953-A1D6-568F980002B8}" type="datetimeFigureOut">
               <a:rPr lang="en-US" smtClean="0"/>
-              <a:t>1/20/2025</a:t>
+              <a:t>1/21/2025</a:t>
             </a:fld>
             <a:endParaRPr lang="en-US"/>
           </a:p>
@@ -5775,13 +6095,8 @@
           <a:p>
             <a:r>
               <a:rPr lang="en-US" sz="3200" dirty="0"/>
-              <a:t>– Need to define </a:t>
-            </a:r>
-            <a:r>
-              <a:rPr lang="en-US" sz="3200"/>
-              <a:t>another variable dd</a:t>
-            </a:r>
-            <a:endParaRPr lang="en-US" sz="3200" dirty="0"/>
+              <a:t>– Need to define another variable dd</a:t>
+            </a:r>
           </a:p>
           <a:p>
             <a:r>

</xml_diff>